<commit_message>
Quick Update - Product Recall Part 2
Sorry.
</commit_message>
<xml_diff>
--- a/Product_Recall/CIS250 Joins - We have had a recall!.pptx
+++ b/Product_Recall/CIS250 Joins - We have had a recall!.pptx
@@ -279,7 +279,7 @@
           <a:p>
             <a:fld id="{1160EA64-D806-43AC-9DF2-F8C432F32B4C}" type="datetimeFigureOut">
               <a:rPr lang="en-US" dirty="0"/>
-              <a:t>9/10/2019</a:t>
+              <a:t>9/17/2019</a:t>
             </a:fld>
             <a:endParaRPr lang="en-US" dirty="0"/>
           </a:p>
@@ -453,7 +453,7 @@
           <a:p>
             <a:fld id="{E9F9C37B-1D36-470B-8223-D6C91242EC14}" type="datetimeFigureOut">
               <a:rPr lang="en-US" dirty="0"/>
-              <a:t>9/10/2019</a:t>
+              <a:t>9/17/2019</a:t>
             </a:fld>
             <a:endParaRPr lang="en-US" dirty="0"/>
           </a:p>
@@ -636,7 +636,7 @@
           <a:p>
             <a:fld id="{67C6F52A-A82B-47A2-A83A-8C4C91F2D59F}" type="datetimeFigureOut">
               <a:rPr lang="en-US" dirty="0"/>
-              <a:t>9/10/2019</a:t>
+              <a:t>9/17/2019</a:t>
             </a:fld>
             <a:endParaRPr lang="en-US" dirty="0"/>
           </a:p>
@@ -809,7 +809,7 @@
           <a:p>
             <a:fld id="{F070A7B3-6521-4DCA-87E5-044747A908C1}" type="datetimeFigureOut">
               <a:rPr lang="en-US" dirty="0"/>
-              <a:t>9/10/2019</a:t>
+              <a:t>9/17/2019</a:t>
             </a:fld>
             <a:endParaRPr lang="en-US" dirty="0"/>
           </a:p>
@@ -1081,7 +1081,7 @@
           <a:p>
             <a:fld id="{1160EA64-D806-43AC-9DF2-F8C432F32B4C}" type="datetimeFigureOut">
               <a:rPr lang="en-US" dirty="0"/>
-              <a:t>9/10/2019</a:t>
+              <a:t>9/17/2019</a:t>
             </a:fld>
             <a:endParaRPr lang="en-US" dirty="0"/>
           </a:p>
@@ -1317,7 +1317,7 @@
           <a:p>
             <a:fld id="{AB134690-1557-4C89-A502-4959FE7FAD70}" type="datetimeFigureOut">
               <a:rPr lang="en-US" dirty="0"/>
-              <a:t>9/10/2019</a:t>
+              <a:t>9/17/2019</a:t>
             </a:fld>
             <a:endParaRPr lang="en-US" dirty="0"/>
           </a:p>
@@ -1679,7 +1679,7 @@
           <a:p>
             <a:fld id="{4F7D4976-E339-4826-83B7-FBD03F55ECF8}" type="datetimeFigureOut">
               <a:rPr lang="en-US" dirty="0"/>
-              <a:t>9/10/2019</a:t>
+              <a:t>9/17/2019</a:t>
             </a:fld>
             <a:endParaRPr lang="en-US" dirty="0"/>
           </a:p>
@@ -1823,7 +1823,7 @@
           <a:p>
             <a:fld id="{E1037C31-9E7A-4F99-8774-A0E530DE1A42}" type="datetimeFigureOut">
               <a:rPr lang="en-US" dirty="0"/>
-              <a:t>9/10/2019</a:t>
+              <a:t>9/17/2019</a:t>
             </a:fld>
             <a:endParaRPr lang="en-US" dirty="0"/>
           </a:p>
@@ -1921,7 +1921,7 @@
           <a:p>
             <a:fld id="{C278504F-A551-4DE0-9316-4DCD1D8CC752}" type="datetimeFigureOut">
               <a:rPr lang="en-US" dirty="0"/>
-              <a:t>9/10/2019</a:t>
+              <a:t>9/17/2019</a:t>
             </a:fld>
             <a:endParaRPr lang="en-US" dirty="0"/>
           </a:p>
@@ -2281,7 +2281,7 @@
           <a:p>
             <a:fld id="{D1BE4249-C0D0-4B06-8692-E8BB871AF643}" type="datetimeFigureOut">
               <a:rPr lang="en-US" dirty="0"/>
-              <a:t>9/10/2019</a:t>
+              <a:t>9/17/2019</a:t>
             </a:fld>
             <a:endParaRPr lang="en-US" dirty="0"/>
           </a:p>
@@ -2641,7 +2641,7 @@
           <a:p>
             <a:fld id="{042B0DB6-F5C7-45FB-8CF3-31B45F9C2DAC}" type="datetimeFigureOut">
               <a:rPr lang="en-US" dirty="0"/>
-              <a:t>9/10/2019</a:t>
+              <a:t>9/17/2019</a:t>
             </a:fld>
             <a:endParaRPr lang="en-US" dirty="0"/>
           </a:p>
@@ -2885,7 +2885,7 @@
           <a:p>
             <a:fld id="{1160EA64-D806-43AC-9DF2-F8C432F32B4C}" type="datetimeFigureOut">
               <a:rPr lang="en-US" dirty="0"/>
-              <a:t>9/10/2019</a:t>
+              <a:t>9/17/2019</a:t>
             </a:fld>
             <a:endParaRPr lang="en-US" dirty="0"/>
           </a:p>
@@ -3606,15 +3606,21 @@
           <p:nvPr/>
         </p:nvPicPr>
         <p:blipFill>
-          <a:blip r:embed="rId2"/>
+          <a:blip r:embed="rId2">
+            <a:extLst>
+              <a:ext uri="{28A0092B-C50C-407E-A947-70E740481C1C}">
+                <a14:useLocalDpi xmlns:a14="http://schemas.microsoft.com/office/drawing/2010/main" val="0"/>
+              </a:ext>
+            </a:extLst>
+          </a:blip>
           <a:stretch>
             <a:fillRect/>
           </a:stretch>
         </p:blipFill>
         <p:spPr>
           <a:xfrm>
-            <a:off x="1366754" y="3429000"/>
-            <a:ext cx="9102110" cy="891116"/>
+            <a:off x="1366754" y="3463699"/>
+            <a:ext cx="9102110" cy="821717"/>
           </a:xfrm>
           <a:prstGeom prst="rect">
             <a:avLst/>
@@ -3635,7 +3641,7 @@
         </p:nvSpPr>
         <p:spPr>
           <a:xfrm>
-            <a:off x="1171408" y="3236763"/>
+            <a:off x="1281475" y="3236762"/>
             <a:ext cx="4284746" cy="1275589"/>
           </a:xfrm>
           <a:prstGeom prst="roundRect">
@@ -3886,15 +3892,21 @@
           <p:nvPr/>
         </p:nvPicPr>
         <p:blipFill>
-          <a:blip r:embed="rId2"/>
+          <a:blip r:embed="rId2">
+            <a:extLst>
+              <a:ext uri="{28A0092B-C50C-407E-A947-70E740481C1C}">
+                <a14:useLocalDpi xmlns:a14="http://schemas.microsoft.com/office/drawing/2010/main" val="0"/>
+              </a:ext>
+            </a:extLst>
+          </a:blip>
           <a:stretch>
             <a:fillRect/>
           </a:stretch>
         </p:blipFill>
         <p:spPr>
           <a:xfrm>
-            <a:off x="1341354" y="3619500"/>
-            <a:ext cx="9102110" cy="891116"/>
+            <a:off x="1341354" y="3654199"/>
+            <a:ext cx="9102110" cy="821717"/>
           </a:xfrm>
           <a:prstGeom prst="rect">
             <a:avLst/>
@@ -3915,7 +3927,7 @@
         </p:nvSpPr>
         <p:spPr>
           <a:xfrm>
-            <a:off x="8915400" y="3429000"/>
+            <a:off x="8856134" y="3379257"/>
             <a:ext cx="1714500" cy="1371600"/>
           </a:xfrm>
           <a:prstGeom prst="roundRect">

</xml_diff>